<commit_message>
Minor changes to templates in font consistency
</commit_message>
<xml_diff>
--- a/templates/UKRI-stfc-nerc-ceda-ncas-nceo-Presentation-Template.pptx
+++ b/templates/UKRI-stfc-nerc-ceda-ncas-nceo-Presentation-Template.pptx
@@ -444,7 +444,7 @@
             <a:lvl1pPr algn="l">
               <a:defRPr sz="3200" baseline="0">
                 <a:solidFill>
-                  <a:srgbClr val="63666A"/>
+                  <a:schemeClr val="tx1"/>
                 </a:solidFill>
               </a:defRPr>
             </a:lvl1pPr>
@@ -553,7 +553,7 @@
               <a:tabLst/>
               <a:defRPr sz="2400">
                 <a:solidFill>
-                  <a:srgbClr val="63666A"/>
+                  <a:schemeClr val="tx1"/>
                 </a:solidFill>
                 <a:latin typeface="+mn-lt"/>
                 <a:cs typeface="Arial" panose="020B0604020202020204" pitchFamily="34" charset="0"/>
@@ -704,7 +704,7 @@
             <a:lvl1pPr algn="l">
               <a:defRPr sz="3200" baseline="0">
                 <a:solidFill>
-                  <a:srgbClr val="63666A"/>
+                  <a:schemeClr val="tx1"/>
                 </a:solidFill>
               </a:defRPr>
             </a:lvl1pPr>
@@ -758,7 +758,7 @@
               <a:tabLst/>
               <a:defRPr sz="2400">
                 <a:solidFill>
-                  <a:srgbClr val="63666A"/>
+                  <a:schemeClr val="tx1"/>
                 </a:solidFill>
                 <a:latin typeface="+mn-lt"/>
                 <a:cs typeface="Arial" panose="020B0604020202020204" pitchFamily="34" charset="0"/>
@@ -886,7 +886,7 @@
             <a:lvl1pPr algn="l">
               <a:defRPr sz="4000" baseline="0">
                 <a:solidFill>
-                  <a:srgbClr val="63666A"/>
+                  <a:schemeClr val="tx1"/>
                 </a:solidFill>
               </a:defRPr>
             </a:lvl1pPr>
@@ -925,7 +925,7 @@
               <a:buNone/>
               <a:defRPr sz="2000" baseline="0">
                 <a:solidFill>
-                  <a:srgbClr val="63666A"/>
+                  <a:schemeClr val="tx1"/>
                 </a:solidFill>
                 <a:latin typeface="+mn-lt"/>
                 <a:cs typeface="Arial" panose="020B0604020202020204" pitchFamily="34" charset="0"/>
@@ -1572,13 +1572,7 @@
       </p:grpSpPr>
       <p:sp>
         <p:nvSpPr>
-          <p:cNvPr id="9" name="Title 8">
-            <a:extLst>
-              <a:ext uri="{FF2B5EF4-FFF2-40B4-BE49-F238E27FC236}">
-                <a16:creationId xmlns:a16="http://schemas.microsoft.com/office/drawing/2014/main" id="{1E0D16EA-1C47-AC4F-8817-5C72D26E6A26}"/>
-              </a:ext>
-            </a:extLst>
-          </p:cNvPr>
+          <p:cNvPr id="2" name="Title 1"/>
           <p:cNvSpPr>
             <a:spLocks noGrp="1"/>
           </p:cNvSpPr>
@@ -1591,19 +1585,13 @@
           <a:bodyPr/>
           <a:lstStyle/>
           <a:p>
-            <a:endParaRPr lang="en-US" dirty="0"/>
+            <a:endParaRPr lang="en-GB" dirty="0"/>
           </a:p>
         </p:txBody>
       </p:sp>
       <p:sp>
         <p:nvSpPr>
-          <p:cNvPr id="10" name="Subtitle 9">
-            <a:extLst>
-              <a:ext uri="{FF2B5EF4-FFF2-40B4-BE49-F238E27FC236}">
-                <a16:creationId xmlns:a16="http://schemas.microsoft.com/office/drawing/2014/main" id="{793D638F-A96A-2C47-B4F3-5D33FBA100D7}"/>
-              </a:ext>
-            </a:extLst>
-          </p:cNvPr>
+          <p:cNvPr id="3" name="Subtitle 2"/>
           <p:cNvSpPr>
             <a:spLocks noGrp="1"/>
           </p:cNvSpPr>
@@ -1616,7 +1604,7 @@
           <a:bodyPr/>
           <a:lstStyle/>
           <a:p>
-            <a:endParaRPr lang="en-US" dirty="0"/>
+            <a:endParaRPr lang="en-GB" dirty="0"/>
           </a:p>
         </p:txBody>
       </p:sp>
@@ -1687,7 +1675,7 @@
       </p:grpSpPr>
       <p:sp>
         <p:nvSpPr>
-          <p:cNvPr id="2" name="Title 1"/>
+          <p:cNvPr id="8" name="Title 7"/>
           <p:cNvSpPr>
             <a:spLocks noGrp="1"/>
           </p:cNvSpPr>
@@ -1706,7 +1694,7 @@
       </p:sp>
       <p:sp>
         <p:nvSpPr>
-          <p:cNvPr id="3" name="Picture Placeholder 2"/>
+          <p:cNvPr id="9" name="Picture Placeholder 8"/>
           <p:cNvSpPr>
             <a:spLocks noGrp="1"/>
           </p:cNvSpPr>
@@ -1718,7 +1706,7 @@
       </p:sp>
       <p:sp>
         <p:nvSpPr>
-          <p:cNvPr id="4" name="Text Placeholder 3"/>
+          <p:cNvPr id="10" name="Text Placeholder 9"/>
           <p:cNvSpPr>
             <a:spLocks noGrp="1"/>
           </p:cNvSpPr>
@@ -1767,7 +1755,7 @@
       </p:grpSpPr>
       <p:sp>
         <p:nvSpPr>
-          <p:cNvPr id="2" name="Title 1"/>
+          <p:cNvPr id="4" name="Title 3"/>
           <p:cNvSpPr>
             <a:spLocks noGrp="1"/>
           </p:cNvSpPr>
@@ -1780,13 +1768,13 @@
           <a:bodyPr/>
           <a:lstStyle/>
           <a:p>
-            <a:endParaRPr lang="en-GB"/>
+            <a:endParaRPr lang="en-GB" dirty="0"/>
           </a:p>
         </p:txBody>
       </p:sp>
       <p:sp>
         <p:nvSpPr>
-          <p:cNvPr id="3" name="Text Placeholder 2"/>
+          <p:cNvPr id="5" name="Text Placeholder 4"/>
           <p:cNvSpPr>
             <a:spLocks noGrp="1"/>
           </p:cNvSpPr>
@@ -1799,7 +1787,7 @@
           <a:bodyPr/>
           <a:lstStyle/>
           <a:p>
-            <a:endParaRPr lang="en-GB"/>
+            <a:endParaRPr lang="en-GB" dirty="0"/>
           </a:p>
         </p:txBody>
       </p:sp>

</xml_diff>